<commit_message>
[ADDITIVE] Added exaplanation and example images
</commit_message>
<xml_diff>
--- a/Help/images/img_sources.pptx
+++ b/Help/images/img_sources.pptx
@@ -13,6 +13,7 @@
     <p:sldId id="257" r:id="rId7"/>
     <p:sldId id="258" r:id="rId8"/>
     <p:sldId id="260" r:id="rId9"/>
+    <p:sldId id="264" r:id="rId10"/>
   </p:sldIdLst>
   <p:sldSz cx="9144000" cy="6858000" type="screen4x3"/>
   <p:notesSz cx="6858000" cy="9144000"/>
@@ -295,7 +296,7 @@
           <a:p>
             <a:fld id="{54379204-0DE5-4A8F-A5DB-A53F02487498}" type="datetimeFigureOut">
               <a:rPr lang="en-US" smtClean="0"/>
-              <a:t>3/25/2013</a:t>
+              <a:t>4/2/2013</a:t>
             </a:fld>
             <a:endParaRPr lang="en-US"/>
           </a:p>
@@ -465,7 +466,7 @@
           <a:p>
             <a:fld id="{54379204-0DE5-4A8F-A5DB-A53F02487498}" type="datetimeFigureOut">
               <a:rPr lang="en-US" smtClean="0"/>
-              <a:t>3/25/2013</a:t>
+              <a:t>4/2/2013</a:t>
             </a:fld>
             <a:endParaRPr lang="en-US"/>
           </a:p>
@@ -645,7 +646,7 @@
           <a:p>
             <a:fld id="{54379204-0DE5-4A8F-A5DB-A53F02487498}" type="datetimeFigureOut">
               <a:rPr lang="en-US" smtClean="0"/>
-              <a:t>3/25/2013</a:t>
+              <a:t>4/2/2013</a:t>
             </a:fld>
             <a:endParaRPr lang="en-US"/>
           </a:p>
@@ -815,7 +816,7 @@
           <a:p>
             <a:fld id="{54379204-0DE5-4A8F-A5DB-A53F02487498}" type="datetimeFigureOut">
               <a:rPr lang="en-US" smtClean="0"/>
-              <a:t>3/25/2013</a:t>
+              <a:t>4/2/2013</a:t>
             </a:fld>
             <a:endParaRPr lang="en-US"/>
           </a:p>
@@ -1061,7 +1062,7 @@
           <a:p>
             <a:fld id="{54379204-0DE5-4A8F-A5DB-A53F02487498}" type="datetimeFigureOut">
               <a:rPr lang="en-US" smtClean="0"/>
-              <a:t>3/25/2013</a:t>
+              <a:t>4/2/2013</a:t>
             </a:fld>
             <a:endParaRPr lang="en-US"/>
           </a:p>
@@ -1349,7 +1350,7 @@
           <a:p>
             <a:fld id="{54379204-0DE5-4A8F-A5DB-A53F02487498}" type="datetimeFigureOut">
               <a:rPr lang="en-US" smtClean="0"/>
-              <a:t>3/25/2013</a:t>
+              <a:t>4/2/2013</a:t>
             </a:fld>
             <a:endParaRPr lang="en-US"/>
           </a:p>
@@ -1771,7 +1772,7 @@
           <a:p>
             <a:fld id="{54379204-0DE5-4A8F-A5DB-A53F02487498}" type="datetimeFigureOut">
               <a:rPr lang="en-US" smtClean="0"/>
-              <a:t>3/25/2013</a:t>
+              <a:t>4/2/2013</a:t>
             </a:fld>
             <a:endParaRPr lang="en-US"/>
           </a:p>
@@ -1889,7 +1890,7 @@
           <a:p>
             <a:fld id="{54379204-0DE5-4A8F-A5DB-A53F02487498}" type="datetimeFigureOut">
               <a:rPr lang="en-US" smtClean="0"/>
-              <a:t>3/25/2013</a:t>
+              <a:t>4/2/2013</a:t>
             </a:fld>
             <a:endParaRPr lang="en-US"/>
           </a:p>
@@ -1984,7 +1985,7 @@
           <a:p>
             <a:fld id="{54379204-0DE5-4A8F-A5DB-A53F02487498}" type="datetimeFigureOut">
               <a:rPr lang="en-US" smtClean="0"/>
-              <a:t>3/25/2013</a:t>
+              <a:t>4/2/2013</a:t>
             </a:fld>
             <a:endParaRPr lang="en-US"/>
           </a:p>
@@ -2261,7 +2262,7 @@
           <a:p>
             <a:fld id="{54379204-0DE5-4A8F-A5DB-A53F02487498}" type="datetimeFigureOut">
               <a:rPr lang="en-US" smtClean="0"/>
-              <a:t>3/25/2013</a:t>
+              <a:t>4/2/2013</a:t>
             </a:fld>
             <a:endParaRPr lang="en-US"/>
           </a:p>
@@ -2514,7 +2515,7 @@
           <a:p>
             <a:fld id="{54379204-0DE5-4A8F-A5DB-A53F02487498}" type="datetimeFigureOut">
               <a:rPr lang="en-US" smtClean="0"/>
-              <a:t>3/25/2013</a:t>
+              <a:t>4/2/2013</a:t>
             </a:fld>
             <a:endParaRPr lang="en-US"/>
           </a:p>
@@ -2727,7 +2728,7 @@
           <a:p>
             <a:fld id="{54379204-0DE5-4A8F-A5DB-A53F02487498}" type="datetimeFigureOut">
               <a:rPr lang="en-US" smtClean="0"/>
-              <a:t>3/25/2013</a:t>
+              <a:t>4/2/2013</a:t>
             </a:fld>
             <a:endParaRPr lang="en-US"/>
           </a:p>
@@ -9401,6 +9402,1621 @@
 </p:sld>
 </file>
 
+<file path=ppt/slides/slide9.xml><?xml version="1.0" encoding="utf-8"?>
+<p:sld xmlns:a="http://schemas.openxmlformats.org/drawingml/2006/main" xmlns:r="http://schemas.openxmlformats.org/officeDocument/2006/relationships" xmlns:p="http://schemas.openxmlformats.org/presentationml/2006/main">
+  <p:cSld>
+    <p:spTree>
+      <p:nvGrpSpPr>
+        <p:cNvPr id="1" name=""/>
+        <p:cNvGrpSpPr/>
+        <p:nvPr/>
+      </p:nvGrpSpPr>
+      <p:grpSpPr>
+        <a:xfrm>
+          <a:off x="0" y="0"/>
+          <a:ext cx="0" cy="0"/>
+          <a:chOff x="0" y="0"/>
+          <a:chExt cx="0" cy="0"/>
+        </a:xfrm>
+      </p:grpSpPr>
+      <p:sp>
+        <p:nvSpPr>
+          <p:cNvPr id="2" name="Title 1"/>
+          <p:cNvSpPr>
+            <a:spLocks noGrp="1"/>
+          </p:cNvSpPr>
+          <p:nvPr>
+            <p:ph type="title"/>
+          </p:nvPr>
+        </p:nvSpPr>
+        <p:spPr/>
+        <p:txBody>
+          <a:bodyPr/>
+          <a:lstStyle/>
+          <a:p>
+            <a:endParaRPr lang="en-US"/>
+          </a:p>
+        </p:txBody>
+      </p:sp>
+      <p:sp>
+        <p:nvSpPr>
+          <p:cNvPr id="3" name="Content Placeholder 2"/>
+          <p:cNvSpPr>
+            <a:spLocks noGrp="1"/>
+          </p:cNvSpPr>
+          <p:nvPr>
+            <p:ph idx="1"/>
+          </p:nvPr>
+        </p:nvSpPr>
+        <p:spPr>
+          <a:xfrm>
+            <a:off x="3923928" y="1600200"/>
+            <a:ext cx="4762872" cy="4525963"/>
+          </a:xfrm>
+        </p:spPr>
+        <p:txBody>
+          <a:bodyPr/>
+          <a:lstStyle/>
+          <a:p>
+            <a:endParaRPr lang="en-US" dirty="0"/>
+          </a:p>
+        </p:txBody>
+      </p:sp>
+      <p:sp>
+        <p:nvSpPr>
+          <p:cNvPr id="4" name="Rectangle 3"/>
+          <p:cNvSpPr/>
+          <p:nvPr/>
+        </p:nvSpPr>
+        <p:spPr>
+          <a:xfrm>
+            <a:off x="1079612" y="1988840"/>
+            <a:ext cx="916653" cy="1764196"/>
+          </a:xfrm>
+          <a:prstGeom prst="rect">
+            <a:avLst/>
+          </a:prstGeom>
+          <a:solidFill>
+            <a:srgbClr val="C3D0F0"/>
+          </a:solidFill>
+          <a:ln w="12700">
+            <a:solidFill>
+              <a:schemeClr val="tx1"/>
+            </a:solidFill>
+            <a:tailEnd type="none"/>
+          </a:ln>
+          <a:effectLst/>
+        </p:spPr>
+        <p:style>
+          <a:lnRef idx="1">
+            <a:schemeClr val="accent4"/>
+          </a:lnRef>
+          <a:fillRef idx="2">
+            <a:schemeClr val="accent4"/>
+          </a:fillRef>
+          <a:effectRef idx="1">
+            <a:schemeClr val="accent4"/>
+          </a:effectRef>
+          <a:fontRef idx="minor">
+            <a:schemeClr val="dk1"/>
+          </a:fontRef>
+        </p:style>
+        <p:txBody>
+          <a:bodyPr tIns="0" bIns="0" anchor="t" anchorCtr="0">
+            <a:noAutofit/>
+          </a:bodyPr>
+          <a:lstStyle>
+            <a:defPPr>
+              <a:defRPr lang="en-US"/>
+            </a:defPPr>
+            <a:lvl1pPr marL="0" algn="l" defTabSz="914400" rtl="0" eaLnBrk="1" latinLnBrk="0" hangingPunct="1">
+              <a:defRPr sz="1800" kern="1200">
+                <a:solidFill>
+                  <a:schemeClr val="dk1"/>
+                </a:solidFill>
+                <a:latin typeface="+mn-lt"/>
+                <a:ea typeface="+mn-ea"/>
+                <a:cs typeface="+mn-cs"/>
+              </a:defRPr>
+            </a:lvl1pPr>
+            <a:lvl2pPr marL="457200" algn="l" defTabSz="914400" rtl="0" eaLnBrk="1" latinLnBrk="0" hangingPunct="1">
+              <a:defRPr sz="1800" kern="1200">
+                <a:solidFill>
+                  <a:schemeClr val="dk1"/>
+                </a:solidFill>
+                <a:latin typeface="+mn-lt"/>
+                <a:ea typeface="+mn-ea"/>
+                <a:cs typeface="+mn-cs"/>
+              </a:defRPr>
+            </a:lvl2pPr>
+            <a:lvl3pPr marL="914400" algn="l" defTabSz="914400" rtl="0" eaLnBrk="1" latinLnBrk="0" hangingPunct="1">
+              <a:defRPr sz="1800" kern="1200">
+                <a:solidFill>
+                  <a:schemeClr val="dk1"/>
+                </a:solidFill>
+                <a:latin typeface="+mn-lt"/>
+                <a:ea typeface="+mn-ea"/>
+                <a:cs typeface="+mn-cs"/>
+              </a:defRPr>
+            </a:lvl3pPr>
+            <a:lvl4pPr marL="1371600" algn="l" defTabSz="914400" rtl="0" eaLnBrk="1" latinLnBrk="0" hangingPunct="1">
+              <a:defRPr sz="1800" kern="1200">
+                <a:solidFill>
+                  <a:schemeClr val="dk1"/>
+                </a:solidFill>
+                <a:latin typeface="+mn-lt"/>
+                <a:ea typeface="+mn-ea"/>
+                <a:cs typeface="+mn-cs"/>
+              </a:defRPr>
+            </a:lvl4pPr>
+            <a:lvl5pPr marL="1828800" algn="l" defTabSz="914400" rtl="0" eaLnBrk="1" latinLnBrk="0" hangingPunct="1">
+              <a:defRPr sz="1800" kern="1200">
+                <a:solidFill>
+                  <a:schemeClr val="dk1"/>
+                </a:solidFill>
+                <a:latin typeface="+mn-lt"/>
+                <a:ea typeface="+mn-ea"/>
+                <a:cs typeface="+mn-cs"/>
+              </a:defRPr>
+            </a:lvl5pPr>
+            <a:lvl6pPr marL="2286000" algn="l" defTabSz="914400" rtl="0" eaLnBrk="1" latinLnBrk="0" hangingPunct="1">
+              <a:defRPr sz="1800" kern="1200">
+                <a:solidFill>
+                  <a:schemeClr val="dk1"/>
+                </a:solidFill>
+                <a:latin typeface="+mn-lt"/>
+                <a:ea typeface="+mn-ea"/>
+                <a:cs typeface="+mn-cs"/>
+              </a:defRPr>
+            </a:lvl6pPr>
+            <a:lvl7pPr marL="2743200" algn="l" defTabSz="914400" rtl="0" eaLnBrk="1" latinLnBrk="0" hangingPunct="1">
+              <a:defRPr sz="1800" kern="1200">
+                <a:solidFill>
+                  <a:schemeClr val="dk1"/>
+                </a:solidFill>
+                <a:latin typeface="+mn-lt"/>
+                <a:ea typeface="+mn-ea"/>
+                <a:cs typeface="+mn-cs"/>
+              </a:defRPr>
+            </a:lvl7pPr>
+            <a:lvl8pPr marL="3200400" algn="l" defTabSz="914400" rtl="0" eaLnBrk="1" latinLnBrk="0" hangingPunct="1">
+              <a:defRPr sz="1800" kern="1200">
+                <a:solidFill>
+                  <a:schemeClr val="dk1"/>
+                </a:solidFill>
+                <a:latin typeface="+mn-lt"/>
+                <a:ea typeface="+mn-ea"/>
+                <a:cs typeface="+mn-cs"/>
+              </a:defRPr>
+            </a:lvl8pPr>
+            <a:lvl9pPr marL="3657600" algn="l" defTabSz="914400" rtl="0" eaLnBrk="1" latinLnBrk="0" hangingPunct="1">
+              <a:defRPr sz="1800" kern="1200">
+                <a:solidFill>
+                  <a:schemeClr val="dk1"/>
+                </a:solidFill>
+                <a:latin typeface="+mn-lt"/>
+                <a:ea typeface="+mn-ea"/>
+                <a:cs typeface="+mn-cs"/>
+              </a:defRPr>
+            </a:lvl9pPr>
+          </a:lstStyle>
+          <a:p>
+            <a:pPr algn="ctr" fontAlgn="base">
+              <a:spcBef>
+                <a:spcPct val="0"/>
+              </a:spcBef>
+              <a:spcAft>
+                <a:spcPct val="0"/>
+              </a:spcAft>
+            </a:pPr>
+            <a:r>
+              <a:rPr lang="fi-FI" sz="1200" b="1" i="1" dirty="0" smtClean="0">
+                <a:solidFill>
+                  <a:prstClr val="black"/>
+                </a:solidFill>
+                <a:latin typeface="Calibri" pitchFamily="34" charset="0"/>
+                <a:cs typeface="Calibri" pitchFamily="34" charset="0"/>
+              </a:rPr>
+              <a:t>component</a:t>
+            </a:r>
+            <a:r>
+              <a:rPr lang="fi-FI" sz="1200" b="1" dirty="0" smtClean="0">
+                <a:solidFill>
+                  <a:prstClr val="black"/>
+                </a:solidFill>
+                <a:latin typeface="Calibri" pitchFamily="34" charset="0"/>
+                <a:cs typeface="Calibri" pitchFamily="34" charset="0"/>
+              </a:rPr>
+              <a:t> </a:t>
+            </a:r>
+            <a:r>
+              <a:rPr lang="fi-FI" sz="1200" b="1" dirty="0" err="1" smtClean="0">
+                <a:solidFill>
+                  <a:prstClr val="black"/>
+                </a:solidFill>
+                <a:latin typeface="Calibri" pitchFamily="34" charset="0"/>
+                <a:cs typeface="Calibri" pitchFamily="34" charset="0"/>
+              </a:rPr>
+              <a:t>Foo</a:t>
+            </a:r>
+            <a:endParaRPr lang="fi-FI" sz="1200" b="1" dirty="0" smtClean="0">
+              <a:solidFill>
+                <a:prstClr val="black"/>
+              </a:solidFill>
+              <a:latin typeface="Calibri" pitchFamily="34" charset="0"/>
+              <a:cs typeface="Calibri" pitchFamily="34" charset="0"/>
+            </a:endParaRPr>
+          </a:p>
+        </p:txBody>
+      </p:sp>
+      <p:sp>
+        <p:nvSpPr>
+          <p:cNvPr id="6" name="TextBox 5"/>
+          <p:cNvSpPr txBox="1"/>
+          <p:nvPr/>
+        </p:nvSpPr>
+        <p:spPr>
+          <a:xfrm>
+            <a:off x="2159732" y="2368041"/>
+            <a:ext cx="1296144" cy="1384995"/>
+          </a:xfrm>
+          <a:prstGeom prst="rect">
+            <a:avLst/>
+          </a:prstGeom>
+          <a:noFill/>
+        </p:spPr>
+        <p:txBody>
+          <a:bodyPr wrap="square" rtlCol="0">
+            <a:spAutoFit/>
+          </a:bodyPr>
+          <a:lstStyle/>
+          <a:p>
+            <a:r>
+              <a:rPr lang="fi-FI" sz="1200" i="1" dirty="0" err="1" smtClean="0"/>
+              <a:t>master</a:t>
+            </a:r>
+            <a:r>
+              <a:rPr lang="fi-FI" sz="1200" i="1" dirty="0" smtClean="0"/>
+              <a:t>  </a:t>
+            </a:r>
+            <a:r>
+              <a:rPr lang="fi-FI" sz="1200" i="1" dirty="0" err="1" smtClean="0"/>
+              <a:t>bus</a:t>
+            </a:r>
+            <a:r>
+              <a:rPr lang="fi-FI" sz="1200" i="1" dirty="0" smtClean="0"/>
+              <a:t> </a:t>
+            </a:r>
+            <a:r>
+              <a:rPr lang="fi-FI" sz="1200" i="1" dirty="0" err="1" smtClean="0"/>
+              <a:t>interface</a:t>
+            </a:r>
+            <a:r>
+              <a:rPr lang="fi-FI" sz="1200" dirty="0" smtClean="0"/>
+              <a:t> MBIF</a:t>
+            </a:r>
+          </a:p>
+          <a:p>
+            <a:r>
+              <a:rPr lang="fi-FI" sz="1200" dirty="0"/>
+              <a:t> </a:t>
+            </a:r>
+            <a:endParaRPr lang="fi-FI" sz="1200" dirty="0" smtClean="0"/>
+          </a:p>
+          <a:p>
+            <a:endParaRPr lang="fi-FI" sz="1200" i="1" dirty="0" smtClean="0"/>
+          </a:p>
+          <a:p>
+            <a:r>
+              <a:rPr lang="fi-FI" sz="1200" i="1" dirty="0" err="1" smtClean="0"/>
+              <a:t>port</a:t>
+            </a:r>
+            <a:r>
+              <a:rPr lang="fi-FI" sz="1200" i="1" dirty="0" smtClean="0"/>
+              <a:t> </a:t>
+            </a:r>
+            <a:r>
+              <a:rPr lang="fi-FI" sz="1200" dirty="0" err="1" smtClean="0"/>
+              <a:t>Data_out</a:t>
+            </a:r>
+            <a:endParaRPr lang="fi-FI" sz="1200" dirty="0" smtClean="0"/>
+          </a:p>
+          <a:p>
+            <a:r>
+              <a:rPr lang="fi-FI" sz="1200" i="1" dirty="0" err="1" smtClean="0"/>
+              <a:t>port</a:t>
+            </a:r>
+            <a:r>
+              <a:rPr lang="fi-FI" sz="1200" i="1" dirty="0" smtClean="0"/>
+              <a:t> </a:t>
+            </a:r>
+            <a:r>
+              <a:rPr lang="fi-FI" sz="1200" dirty="0" err="1" smtClean="0"/>
+              <a:t>Req_out</a:t>
+            </a:r>
+            <a:endParaRPr lang="fi-FI" sz="1200" dirty="0" smtClean="0"/>
+          </a:p>
+          <a:p>
+            <a:r>
+              <a:rPr lang="fi-FI" sz="1200" i="1" dirty="0" err="1" smtClean="0"/>
+              <a:t>port</a:t>
+            </a:r>
+            <a:r>
+              <a:rPr lang="fi-FI" sz="1200" i="1" dirty="0" smtClean="0"/>
+              <a:t> </a:t>
+            </a:r>
+            <a:r>
+              <a:rPr lang="fi-FI" sz="1200" dirty="0" err="1" smtClean="0"/>
+              <a:t>Ack_in</a:t>
+            </a:r>
+            <a:endParaRPr lang="en-US" sz="1200" dirty="0"/>
+          </a:p>
+        </p:txBody>
+      </p:sp>
+      <p:sp>
+        <p:nvSpPr>
+          <p:cNvPr id="27" name="Freeform 26"/>
+          <p:cNvSpPr/>
+          <p:nvPr/>
+        </p:nvSpPr>
+        <p:spPr>
+          <a:xfrm>
+            <a:off x="1537938" y="2552845"/>
+            <a:ext cx="351228" cy="1038539"/>
+          </a:xfrm>
+          <a:custGeom>
+            <a:avLst/>
+            <a:gdLst>
+              <a:gd name="connsiteX0" fmla="*/ 266372 w 266372"/>
+              <a:gd name="connsiteY0" fmla="*/ 527156 h 527156"/>
+              <a:gd name="connsiteX1" fmla="*/ 50472 w 266372"/>
+              <a:gd name="connsiteY1" fmla="*/ 311256 h 527156"/>
+              <a:gd name="connsiteX2" fmla="*/ 12372 w 266372"/>
+              <a:gd name="connsiteY2" fmla="*/ 50906 h 527156"/>
+              <a:gd name="connsiteX3" fmla="*/ 221922 w 266372"/>
+              <a:gd name="connsiteY3" fmla="*/ 106 h 527156"/>
+              <a:gd name="connsiteX0" fmla="*/ 279422 w 279422"/>
+              <a:gd name="connsiteY0" fmla="*/ 529407 h 529407"/>
+              <a:gd name="connsiteX1" fmla="*/ 31772 w 279422"/>
+              <a:gd name="connsiteY1" fmla="*/ 415107 h 529407"/>
+              <a:gd name="connsiteX2" fmla="*/ 25422 w 279422"/>
+              <a:gd name="connsiteY2" fmla="*/ 53157 h 529407"/>
+              <a:gd name="connsiteX3" fmla="*/ 234972 w 279422"/>
+              <a:gd name="connsiteY3" fmla="*/ 2357 h 529407"/>
+              <a:gd name="connsiteX0" fmla="*/ 283278 w 283278"/>
+              <a:gd name="connsiteY0" fmla="*/ 527053 h 527053"/>
+              <a:gd name="connsiteX1" fmla="*/ 35628 w 283278"/>
+              <a:gd name="connsiteY1" fmla="*/ 412753 h 527053"/>
+              <a:gd name="connsiteX2" fmla="*/ 22928 w 283278"/>
+              <a:gd name="connsiteY2" fmla="*/ 146053 h 527053"/>
+              <a:gd name="connsiteX3" fmla="*/ 238828 w 283278"/>
+              <a:gd name="connsiteY3" fmla="*/ 3 h 527053"/>
+              <a:gd name="connsiteX0" fmla="*/ 277708 w 277708"/>
+              <a:gd name="connsiteY0" fmla="*/ 527053 h 527053"/>
+              <a:gd name="connsiteX1" fmla="*/ 42758 w 277708"/>
+              <a:gd name="connsiteY1" fmla="*/ 374653 h 527053"/>
+              <a:gd name="connsiteX2" fmla="*/ 17358 w 277708"/>
+              <a:gd name="connsiteY2" fmla="*/ 146053 h 527053"/>
+              <a:gd name="connsiteX3" fmla="*/ 233258 w 277708"/>
+              <a:gd name="connsiteY3" fmla="*/ 3 h 527053"/>
+              <a:gd name="connsiteX0" fmla="*/ 304252 w 304252"/>
+              <a:gd name="connsiteY0" fmla="*/ 469903 h 469903"/>
+              <a:gd name="connsiteX1" fmla="*/ 43902 w 304252"/>
+              <a:gd name="connsiteY1" fmla="*/ 374653 h 469903"/>
+              <a:gd name="connsiteX2" fmla="*/ 18502 w 304252"/>
+              <a:gd name="connsiteY2" fmla="*/ 146053 h 469903"/>
+              <a:gd name="connsiteX3" fmla="*/ 234402 w 304252"/>
+              <a:gd name="connsiteY3" fmla="*/ 3 h 469903"/>
+              <a:gd name="connsiteX0" fmla="*/ 317253 w 317253"/>
+              <a:gd name="connsiteY0" fmla="*/ 469903 h 469903"/>
+              <a:gd name="connsiteX1" fmla="*/ 31503 w 317253"/>
+              <a:gd name="connsiteY1" fmla="*/ 406403 h 469903"/>
+              <a:gd name="connsiteX2" fmla="*/ 31503 w 317253"/>
+              <a:gd name="connsiteY2" fmla="*/ 146053 h 469903"/>
+              <a:gd name="connsiteX3" fmla="*/ 247403 w 317253"/>
+              <a:gd name="connsiteY3" fmla="*/ 3 h 469903"/>
+              <a:gd name="connsiteX0" fmla="*/ 308938 w 308938"/>
+              <a:gd name="connsiteY0" fmla="*/ 469903 h 479054"/>
+              <a:gd name="connsiteX1" fmla="*/ 175589 w 308938"/>
+              <a:gd name="connsiteY1" fmla="*/ 476254 h 479054"/>
+              <a:gd name="connsiteX2" fmla="*/ 23188 w 308938"/>
+              <a:gd name="connsiteY2" fmla="*/ 406403 h 479054"/>
+              <a:gd name="connsiteX3" fmla="*/ 23188 w 308938"/>
+              <a:gd name="connsiteY3" fmla="*/ 146053 h 479054"/>
+              <a:gd name="connsiteX4" fmla="*/ 239088 w 308938"/>
+              <a:gd name="connsiteY4" fmla="*/ 3 h 479054"/>
+              <a:gd name="connsiteX0" fmla="*/ 314893 w 314893"/>
+              <a:gd name="connsiteY0" fmla="*/ 469903 h 479054"/>
+              <a:gd name="connsiteX1" fmla="*/ 181544 w 314893"/>
+              <a:gd name="connsiteY1" fmla="*/ 476254 h 479054"/>
+              <a:gd name="connsiteX2" fmla="*/ 18469 w 314893"/>
+              <a:gd name="connsiteY2" fmla="*/ 351780 h 479054"/>
+              <a:gd name="connsiteX3" fmla="*/ 29143 w 314893"/>
+              <a:gd name="connsiteY3" fmla="*/ 146053 h 479054"/>
+              <a:gd name="connsiteX4" fmla="*/ 245043 w 314893"/>
+              <a:gd name="connsiteY4" fmla="*/ 3 h 479054"/>
+              <a:gd name="connsiteX0" fmla="*/ 313023 w 313023"/>
+              <a:gd name="connsiteY0" fmla="*/ 469903 h 469903"/>
+              <a:gd name="connsiteX1" fmla="*/ 151209 w 313023"/>
+              <a:gd name="connsiteY1" fmla="*/ 465330 h 469903"/>
+              <a:gd name="connsiteX2" fmla="*/ 16599 w 313023"/>
+              <a:gd name="connsiteY2" fmla="*/ 351780 h 469903"/>
+              <a:gd name="connsiteX3" fmla="*/ 27273 w 313023"/>
+              <a:gd name="connsiteY3" fmla="*/ 146053 h 469903"/>
+              <a:gd name="connsiteX4" fmla="*/ 243173 w 313023"/>
+              <a:gd name="connsiteY4" fmla="*/ 3 h 469903"/>
+              <a:gd name="connsiteX0" fmla="*/ 305299 w 305299"/>
+              <a:gd name="connsiteY0" fmla="*/ 469903 h 469903"/>
+              <a:gd name="connsiteX1" fmla="*/ 143485 w 305299"/>
+              <a:gd name="connsiteY1" fmla="*/ 465330 h 469903"/>
+              <a:gd name="connsiteX2" fmla="*/ 8875 w 305299"/>
+              <a:gd name="connsiteY2" fmla="*/ 351780 h 469903"/>
+              <a:gd name="connsiteX3" fmla="*/ 37340 w 305299"/>
+              <a:gd name="connsiteY3" fmla="*/ 124204 h 469903"/>
+              <a:gd name="connsiteX4" fmla="*/ 235449 w 305299"/>
+              <a:gd name="connsiteY4" fmla="*/ 3 h 469903"/>
+              <a:gd name="connsiteX0" fmla="*/ 305299 w 305299"/>
+              <a:gd name="connsiteY0" fmla="*/ 469903 h 469903"/>
+              <a:gd name="connsiteX1" fmla="*/ 143485 w 305299"/>
+              <a:gd name="connsiteY1" fmla="*/ 465330 h 469903"/>
+              <a:gd name="connsiteX2" fmla="*/ 8875 w 305299"/>
+              <a:gd name="connsiteY2" fmla="*/ 308081 h 469903"/>
+              <a:gd name="connsiteX3" fmla="*/ 37340 w 305299"/>
+              <a:gd name="connsiteY3" fmla="*/ 124204 h 469903"/>
+              <a:gd name="connsiteX4" fmla="*/ 235449 w 305299"/>
+              <a:gd name="connsiteY4" fmla="*/ 3 h 469903"/>
+              <a:gd name="connsiteX0" fmla="*/ 305299 w 305299"/>
+              <a:gd name="connsiteY0" fmla="*/ 469903 h 469903"/>
+              <a:gd name="connsiteX1" fmla="*/ 8875 w 305299"/>
+              <a:gd name="connsiteY1" fmla="*/ 308081 h 469903"/>
+              <a:gd name="connsiteX2" fmla="*/ 37340 w 305299"/>
+              <a:gd name="connsiteY2" fmla="*/ 124204 h 469903"/>
+              <a:gd name="connsiteX3" fmla="*/ 235449 w 305299"/>
+              <a:gd name="connsiteY3" fmla="*/ 3 h 469903"/>
+              <a:gd name="connsiteX0" fmla="*/ 303139 w 303139"/>
+              <a:gd name="connsiteY0" fmla="*/ 469903 h 469903"/>
+              <a:gd name="connsiteX1" fmla="*/ 112157 w 303139"/>
+              <a:gd name="connsiteY1" fmla="*/ 445658 h 469903"/>
+              <a:gd name="connsiteX2" fmla="*/ 6715 w 303139"/>
+              <a:gd name="connsiteY2" fmla="*/ 308081 h 469903"/>
+              <a:gd name="connsiteX3" fmla="*/ 35180 w 303139"/>
+              <a:gd name="connsiteY3" fmla="*/ 124204 h 469903"/>
+              <a:gd name="connsiteX4" fmla="*/ 233289 w 303139"/>
+              <a:gd name="connsiteY4" fmla="*/ 3 h 469903"/>
+              <a:gd name="connsiteX0" fmla="*/ 302084 w 302084"/>
+              <a:gd name="connsiteY0" fmla="*/ 469903 h 469903"/>
+              <a:gd name="connsiteX1" fmla="*/ 96870 w 302084"/>
+              <a:gd name="connsiteY1" fmla="*/ 434734 h 469903"/>
+              <a:gd name="connsiteX2" fmla="*/ 5660 w 302084"/>
+              <a:gd name="connsiteY2" fmla="*/ 308081 h 469903"/>
+              <a:gd name="connsiteX3" fmla="*/ 34125 w 302084"/>
+              <a:gd name="connsiteY3" fmla="*/ 124204 h 469903"/>
+              <a:gd name="connsiteX4" fmla="*/ 232234 w 302084"/>
+              <a:gd name="connsiteY4" fmla="*/ 3 h 469903"/>
+              <a:gd name="connsiteX0" fmla="*/ 302084 w 302084"/>
+              <a:gd name="connsiteY0" fmla="*/ 469903 h 469903"/>
+              <a:gd name="connsiteX1" fmla="*/ 96870 w 302084"/>
+              <a:gd name="connsiteY1" fmla="*/ 450029 h 469903"/>
+              <a:gd name="connsiteX2" fmla="*/ 5660 w 302084"/>
+              <a:gd name="connsiteY2" fmla="*/ 308081 h 469903"/>
+              <a:gd name="connsiteX3" fmla="*/ 34125 w 302084"/>
+              <a:gd name="connsiteY3" fmla="*/ 124204 h 469903"/>
+              <a:gd name="connsiteX4" fmla="*/ 232234 w 302084"/>
+              <a:gd name="connsiteY4" fmla="*/ 3 h 469903"/>
+              <a:gd name="connsiteX0" fmla="*/ 262945 w 262945"/>
+              <a:gd name="connsiteY0" fmla="*/ 476458 h 476458"/>
+              <a:gd name="connsiteX1" fmla="*/ 96870 w 262945"/>
+              <a:gd name="connsiteY1" fmla="*/ 450029 h 476458"/>
+              <a:gd name="connsiteX2" fmla="*/ 5660 w 262945"/>
+              <a:gd name="connsiteY2" fmla="*/ 308081 h 476458"/>
+              <a:gd name="connsiteX3" fmla="*/ 34125 w 262945"/>
+              <a:gd name="connsiteY3" fmla="*/ 124204 h 476458"/>
+              <a:gd name="connsiteX4" fmla="*/ 232234 w 262945"/>
+              <a:gd name="connsiteY4" fmla="*/ 3 h 476458"/>
+              <a:gd name="connsiteX0" fmla="*/ 261364 w 261364"/>
+              <a:gd name="connsiteY0" fmla="*/ 476458 h 476458"/>
+              <a:gd name="connsiteX1" fmla="*/ 73940 w 261364"/>
+              <a:gd name="connsiteY1" fmla="*/ 458769 h 476458"/>
+              <a:gd name="connsiteX2" fmla="*/ 4079 w 261364"/>
+              <a:gd name="connsiteY2" fmla="*/ 308081 h 476458"/>
+              <a:gd name="connsiteX3" fmla="*/ 32544 w 261364"/>
+              <a:gd name="connsiteY3" fmla="*/ 124204 h 476458"/>
+              <a:gd name="connsiteX4" fmla="*/ 230653 w 261364"/>
+              <a:gd name="connsiteY4" fmla="*/ 3 h 476458"/>
+              <a:gd name="connsiteX0" fmla="*/ 300504 w 300504"/>
+              <a:gd name="connsiteY0" fmla="*/ 476458 h 476458"/>
+              <a:gd name="connsiteX1" fmla="*/ 73940 w 300504"/>
+              <a:gd name="connsiteY1" fmla="*/ 458769 h 476458"/>
+              <a:gd name="connsiteX2" fmla="*/ 4079 w 300504"/>
+              <a:gd name="connsiteY2" fmla="*/ 308081 h 476458"/>
+              <a:gd name="connsiteX3" fmla="*/ 32544 w 300504"/>
+              <a:gd name="connsiteY3" fmla="*/ 124204 h 476458"/>
+              <a:gd name="connsiteX4" fmla="*/ 230653 w 300504"/>
+              <a:gd name="connsiteY4" fmla="*/ 3 h 476458"/>
+              <a:gd name="connsiteX0" fmla="*/ 298659 w 298659"/>
+              <a:gd name="connsiteY0" fmla="*/ 476458 h 476458"/>
+              <a:gd name="connsiteX1" fmla="*/ 47188 w 298659"/>
+              <a:gd name="connsiteY1" fmla="*/ 432550 h 476458"/>
+              <a:gd name="connsiteX2" fmla="*/ 2234 w 298659"/>
+              <a:gd name="connsiteY2" fmla="*/ 308081 h 476458"/>
+              <a:gd name="connsiteX3" fmla="*/ 30699 w 298659"/>
+              <a:gd name="connsiteY3" fmla="*/ 124204 h 476458"/>
+              <a:gd name="connsiteX4" fmla="*/ 228808 w 298659"/>
+              <a:gd name="connsiteY4" fmla="*/ 3 h 476458"/>
+              <a:gd name="connsiteX0" fmla="*/ 318164 w 318164"/>
+              <a:gd name="connsiteY0" fmla="*/ 476458 h 476458"/>
+              <a:gd name="connsiteX1" fmla="*/ 66693 w 318164"/>
+              <a:gd name="connsiteY1" fmla="*/ 432550 h 476458"/>
+              <a:gd name="connsiteX2" fmla="*/ 390 w 318164"/>
+              <a:gd name="connsiteY2" fmla="*/ 279677 h 476458"/>
+              <a:gd name="connsiteX3" fmla="*/ 50204 w 318164"/>
+              <a:gd name="connsiteY3" fmla="*/ 124204 h 476458"/>
+              <a:gd name="connsiteX4" fmla="*/ 248313 w 318164"/>
+              <a:gd name="connsiteY4" fmla="*/ 3 h 476458"/>
+              <a:gd name="connsiteX0" fmla="*/ 317779 w 317779"/>
+              <a:gd name="connsiteY0" fmla="*/ 476462 h 476462"/>
+              <a:gd name="connsiteX1" fmla="*/ 66308 w 317779"/>
+              <a:gd name="connsiteY1" fmla="*/ 432554 h 476462"/>
+              <a:gd name="connsiteX2" fmla="*/ 5 w 317779"/>
+              <a:gd name="connsiteY2" fmla="*/ 279681 h 476462"/>
+              <a:gd name="connsiteX3" fmla="*/ 64051 w 317779"/>
+              <a:gd name="connsiteY3" fmla="*/ 73954 h 476462"/>
+              <a:gd name="connsiteX4" fmla="*/ 247928 w 317779"/>
+              <a:gd name="connsiteY4" fmla="*/ 7 h 476462"/>
+              <a:gd name="connsiteX0" fmla="*/ 319384 w 319384"/>
+              <a:gd name="connsiteY0" fmla="*/ 476462 h 476462"/>
+              <a:gd name="connsiteX1" fmla="*/ 121285 w 319384"/>
+              <a:gd name="connsiteY1" fmla="*/ 454403 h 476462"/>
+              <a:gd name="connsiteX2" fmla="*/ 1610 w 319384"/>
+              <a:gd name="connsiteY2" fmla="*/ 279681 h 476462"/>
+              <a:gd name="connsiteX3" fmla="*/ 65656 w 319384"/>
+              <a:gd name="connsiteY3" fmla="*/ 73954 h 476462"/>
+              <a:gd name="connsiteX4" fmla="*/ 249533 w 319384"/>
+              <a:gd name="connsiteY4" fmla="*/ 7 h 476462"/>
+              <a:gd name="connsiteX0" fmla="*/ 319384 w 319384"/>
+              <a:gd name="connsiteY0" fmla="*/ 476462 h 476462"/>
+              <a:gd name="connsiteX1" fmla="*/ 121285 w 319384"/>
+              <a:gd name="connsiteY1" fmla="*/ 454403 h 476462"/>
+              <a:gd name="connsiteX2" fmla="*/ 1610 w 319384"/>
+              <a:gd name="connsiteY2" fmla="*/ 279681 h 476462"/>
+              <a:gd name="connsiteX3" fmla="*/ 65656 w 319384"/>
+              <a:gd name="connsiteY3" fmla="*/ 73954 h 476462"/>
+              <a:gd name="connsiteX4" fmla="*/ 249533 w 319384"/>
+              <a:gd name="connsiteY4" fmla="*/ 7 h 476462"/>
+              <a:gd name="connsiteX0" fmla="*/ 318265 w 318265"/>
+              <a:gd name="connsiteY0" fmla="*/ 476462 h 476462"/>
+              <a:gd name="connsiteX1" fmla="*/ 91701 w 318265"/>
+              <a:gd name="connsiteY1" fmla="*/ 428184 h 476462"/>
+              <a:gd name="connsiteX2" fmla="*/ 491 w 318265"/>
+              <a:gd name="connsiteY2" fmla="*/ 279681 h 476462"/>
+              <a:gd name="connsiteX3" fmla="*/ 64537 w 318265"/>
+              <a:gd name="connsiteY3" fmla="*/ 73954 h 476462"/>
+              <a:gd name="connsiteX4" fmla="*/ 248414 w 318265"/>
+              <a:gd name="connsiteY4" fmla="*/ 7 h 476462"/>
+              <a:gd name="connsiteX0" fmla="*/ 318265 w 318265"/>
+              <a:gd name="connsiteY0" fmla="*/ 476462 h 476462"/>
+              <a:gd name="connsiteX1" fmla="*/ 91701 w 318265"/>
+              <a:gd name="connsiteY1" fmla="*/ 428184 h 476462"/>
+              <a:gd name="connsiteX2" fmla="*/ 491 w 318265"/>
+              <a:gd name="connsiteY2" fmla="*/ 279681 h 476462"/>
+              <a:gd name="connsiteX3" fmla="*/ 64537 w 318265"/>
+              <a:gd name="connsiteY3" fmla="*/ 73954 h 476462"/>
+              <a:gd name="connsiteX4" fmla="*/ 248414 w 318265"/>
+              <a:gd name="connsiteY4" fmla="*/ 7 h 476462"/>
+            </a:gdLst>
+            <a:ahLst/>
+            <a:cxnLst>
+              <a:cxn ang="0">
+                <a:pos x="connsiteX0" y="connsiteY0"/>
+              </a:cxn>
+              <a:cxn ang="0">
+                <a:pos x="connsiteX1" y="connsiteY1"/>
+              </a:cxn>
+              <a:cxn ang="0">
+                <a:pos x="connsiteX2" y="connsiteY2"/>
+              </a:cxn>
+              <a:cxn ang="0">
+                <a:pos x="connsiteX3" y="connsiteY3"/>
+              </a:cxn>
+              <a:cxn ang="0">
+                <a:pos x="connsiteX4" y="connsiteY4"/>
+              </a:cxn>
+            </a:cxnLst>
+            <a:rect l="l" t="t" r="r" b="b"/>
+            <a:pathLst>
+              <a:path w="318265" h="476462">
+                <a:moveTo>
+                  <a:pt x="318265" y="476462"/>
+                </a:moveTo>
+                <a:cubicBezTo>
+                  <a:pt x="281691" y="460040"/>
+                  <a:pt x="176686" y="477003"/>
+                  <a:pt x="91701" y="428184"/>
+                </a:cubicBezTo>
+                <a:cubicBezTo>
+                  <a:pt x="42297" y="401214"/>
+                  <a:pt x="5018" y="338719"/>
+                  <a:pt x="491" y="279681"/>
+                </a:cubicBezTo>
+                <a:cubicBezTo>
+                  <a:pt x="-4036" y="220643"/>
+                  <a:pt x="23217" y="120566"/>
+                  <a:pt x="64537" y="73954"/>
+                </a:cubicBezTo>
+                <a:cubicBezTo>
+                  <a:pt x="105857" y="27342"/>
+                  <a:pt x="157926" y="-522"/>
+                  <a:pt x="248414" y="7"/>
+                </a:cubicBezTo>
+              </a:path>
+            </a:pathLst>
+          </a:custGeom>
+          <a:noFill/>
+          <a:ln w="12700">
+            <a:prstDash val="sysDash"/>
+          </a:ln>
+        </p:spPr>
+        <p:style>
+          <a:lnRef idx="2">
+            <a:schemeClr val="accent1">
+              <a:shade val="50000"/>
+            </a:schemeClr>
+          </a:lnRef>
+          <a:fillRef idx="1">
+            <a:schemeClr val="accent1"/>
+          </a:fillRef>
+          <a:effectRef idx="0">
+            <a:schemeClr val="accent1"/>
+          </a:effectRef>
+          <a:fontRef idx="minor">
+            <a:schemeClr val="lt1"/>
+          </a:fontRef>
+        </p:style>
+        <p:txBody>
+          <a:bodyPr rtlCol="0" anchor="ctr"/>
+          <a:lstStyle/>
+          <a:p>
+            <a:pPr algn="ctr"/>
+            <a:endParaRPr lang="en-US" dirty="0"/>
+          </a:p>
+        </p:txBody>
+      </p:sp>
+      <p:sp>
+        <p:nvSpPr>
+          <p:cNvPr id="29" name="Freeform 28"/>
+          <p:cNvSpPr/>
+          <p:nvPr/>
+        </p:nvSpPr>
+        <p:spPr>
+          <a:xfrm>
+            <a:off x="1676169" y="2619198"/>
+            <a:ext cx="212997" cy="797825"/>
+          </a:xfrm>
+          <a:custGeom>
+            <a:avLst/>
+            <a:gdLst>
+              <a:gd name="connsiteX0" fmla="*/ 266372 w 266372"/>
+              <a:gd name="connsiteY0" fmla="*/ 527156 h 527156"/>
+              <a:gd name="connsiteX1" fmla="*/ 50472 w 266372"/>
+              <a:gd name="connsiteY1" fmla="*/ 311256 h 527156"/>
+              <a:gd name="connsiteX2" fmla="*/ 12372 w 266372"/>
+              <a:gd name="connsiteY2" fmla="*/ 50906 h 527156"/>
+              <a:gd name="connsiteX3" fmla="*/ 221922 w 266372"/>
+              <a:gd name="connsiteY3" fmla="*/ 106 h 527156"/>
+              <a:gd name="connsiteX0" fmla="*/ 279422 w 279422"/>
+              <a:gd name="connsiteY0" fmla="*/ 529407 h 529407"/>
+              <a:gd name="connsiteX1" fmla="*/ 31772 w 279422"/>
+              <a:gd name="connsiteY1" fmla="*/ 415107 h 529407"/>
+              <a:gd name="connsiteX2" fmla="*/ 25422 w 279422"/>
+              <a:gd name="connsiteY2" fmla="*/ 53157 h 529407"/>
+              <a:gd name="connsiteX3" fmla="*/ 234972 w 279422"/>
+              <a:gd name="connsiteY3" fmla="*/ 2357 h 529407"/>
+              <a:gd name="connsiteX0" fmla="*/ 283278 w 283278"/>
+              <a:gd name="connsiteY0" fmla="*/ 527053 h 527053"/>
+              <a:gd name="connsiteX1" fmla="*/ 35628 w 283278"/>
+              <a:gd name="connsiteY1" fmla="*/ 412753 h 527053"/>
+              <a:gd name="connsiteX2" fmla="*/ 22928 w 283278"/>
+              <a:gd name="connsiteY2" fmla="*/ 146053 h 527053"/>
+              <a:gd name="connsiteX3" fmla="*/ 238828 w 283278"/>
+              <a:gd name="connsiteY3" fmla="*/ 3 h 527053"/>
+              <a:gd name="connsiteX0" fmla="*/ 277708 w 277708"/>
+              <a:gd name="connsiteY0" fmla="*/ 527053 h 527053"/>
+              <a:gd name="connsiteX1" fmla="*/ 42758 w 277708"/>
+              <a:gd name="connsiteY1" fmla="*/ 374653 h 527053"/>
+              <a:gd name="connsiteX2" fmla="*/ 17358 w 277708"/>
+              <a:gd name="connsiteY2" fmla="*/ 146053 h 527053"/>
+              <a:gd name="connsiteX3" fmla="*/ 233258 w 277708"/>
+              <a:gd name="connsiteY3" fmla="*/ 3 h 527053"/>
+              <a:gd name="connsiteX0" fmla="*/ 304252 w 304252"/>
+              <a:gd name="connsiteY0" fmla="*/ 469903 h 469903"/>
+              <a:gd name="connsiteX1" fmla="*/ 43902 w 304252"/>
+              <a:gd name="connsiteY1" fmla="*/ 374653 h 469903"/>
+              <a:gd name="connsiteX2" fmla="*/ 18502 w 304252"/>
+              <a:gd name="connsiteY2" fmla="*/ 146053 h 469903"/>
+              <a:gd name="connsiteX3" fmla="*/ 234402 w 304252"/>
+              <a:gd name="connsiteY3" fmla="*/ 3 h 469903"/>
+              <a:gd name="connsiteX0" fmla="*/ 317253 w 317253"/>
+              <a:gd name="connsiteY0" fmla="*/ 469903 h 469903"/>
+              <a:gd name="connsiteX1" fmla="*/ 31503 w 317253"/>
+              <a:gd name="connsiteY1" fmla="*/ 406403 h 469903"/>
+              <a:gd name="connsiteX2" fmla="*/ 31503 w 317253"/>
+              <a:gd name="connsiteY2" fmla="*/ 146053 h 469903"/>
+              <a:gd name="connsiteX3" fmla="*/ 247403 w 317253"/>
+              <a:gd name="connsiteY3" fmla="*/ 3 h 469903"/>
+              <a:gd name="connsiteX0" fmla="*/ 308938 w 308938"/>
+              <a:gd name="connsiteY0" fmla="*/ 469903 h 479054"/>
+              <a:gd name="connsiteX1" fmla="*/ 175589 w 308938"/>
+              <a:gd name="connsiteY1" fmla="*/ 476254 h 479054"/>
+              <a:gd name="connsiteX2" fmla="*/ 23188 w 308938"/>
+              <a:gd name="connsiteY2" fmla="*/ 406403 h 479054"/>
+              <a:gd name="connsiteX3" fmla="*/ 23188 w 308938"/>
+              <a:gd name="connsiteY3" fmla="*/ 146053 h 479054"/>
+              <a:gd name="connsiteX4" fmla="*/ 239088 w 308938"/>
+              <a:gd name="connsiteY4" fmla="*/ 3 h 479054"/>
+              <a:gd name="connsiteX0" fmla="*/ 314893 w 314893"/>
+              <a:gd name="connsiteY0" fmla="*/ 469903 h 479054"/>
+              <a:gd name="connsiteX1" fmla="*/ 181544 w 314893"/>
+              <a:gd name="connsiteY1" fmla="*/ 476254 h 479054"/>
+              <a:gd name="connsiteX2" fmla="*/ 18469 w 314893"/>
+              <a:gd name="connsiteY2" fmla="*/ 351780 h 479054"/>
+              <a:gd name="connsiteX3" fmla="*/ 29143 w 314893"/>
+              <a:gd name="connsiteY3" fmla="*/ 146053 h 479054"/>
+              <a:gd name="connsiteX4" fmla="*/ 245043 w 314893"/>
+              <a:gd name="connsiteY4" fmla="*/ 3 h 479054"/>
+              <a:gd name="connsiteX0" fmla="*/ 313023 w 313023"/>
+              <a:gd name="connsiteY0" fmla="*/ 469903 h 469903"/>
+              <a:gd name="connsiteX1" fmla="*/ 151209 w 313023"/>
+              <a:gd name="connsiteY1" fmla="*/ 465330 h 469903"/>
+              <a:gd name="connsiteX2" fmla="*/ 16599 w 313023"/>
+              <a:gd name="connsiteY2" fmla="*/ 351780 h 469903"/>
+              <a:gd name="connsiteX3" fmla="*/ 27273 w 313023"/>
+              <a:gd name="connsiteY3" fmla="*/ 146053 h 469903"/>
+              <a:gd name="connsiteX4" fmla="*/ 243173 w 313023"/>
+              <a:gd name="connsiteY4" fmla="*/ 3 h 469903"/>
+              <a:gd name="connsiteX0" fmla="*/ 305299 w 305299"/>
+              <a:gd name="connsiteY0" fmla="*/ 469903 h 469903"/>
+              <a:gd name="connsiteX1" fmla="*/ 143485 w 305299"/>
+              <a:gd name="connsiteY1" fmla="*/ 465330 h 469903"/>
+              <a:gd name="connsiteX2" fmla="*/ 8875 w 305299"/>
+              <a:gd name="connsiteY2" fmla="*/ 351780 h 469903"/>
+              <a:gd name="connsiteX3" fmla="*/ 37340 w 305299"/>
+              <a:gd name="connsiteY3" fmla="*/ 124204 h 469903"/>
+              <a:gd name="connsiteX4" fmla="*/ 235449 w 305299"/>
+              <a:gd name="connsiteY4" fmla="*/ 3 h 469903"/>
+              <a:gd name="connsiteX0" fmla="*/ 305299 w 305299"/>
+              <a:gd name="connsiteY0" fmla="*/ 469903 h 469903"/>
+              <a:gd name="connsiteX1" fmla="*/ 143485 w 305299"/>
+              <a:gd name="connsiteY1" fmla="*/ 465330 h 469903"/>
+              <a:gd name="connsiteX2" fmla="*/ 8875 w 305299"/>
+              <a:gd name="connsiteY2" fmla="*/ 308081 h 469903"/>
+              <a:gd name="connsiteX3" fmla="*/ 37340 w 305299"/>
+              <a:gd name="connsiteY3" fmla="*/ 124204 h 469903"/>
+              <a:gd name="connsiteX4" fmla="*/ 235449 w 305299"/>
+              <a:gd name="connsiteY4" fmla="*/ 3 h 469903"/>
+              <a:gd name="connsiteX0" fmla="*/ 305299 w 305299"/>
+              <a:gd name="connsiteY0" fmla="*/ 469903 h 469903"/>
+              <a:gd name="connsiteX1" fmla="*/ 8875 w 305299"/>
+              <a:gd name="connsiteY1" fmla="*/ 308081 h 469903"/>
+              <a:gd name="connsiteX2" fmla="*/ 37340 w 305299"/>
+              <a:gd name="connsiteY2" fmla="*/ 124204 h 469903"/>
+              <a:gd name="connsiteX3" fmla="*/ 235449 w 305299"/>
+              <a:gd name="connsiteY3" fmla="*/ 3 h 469903"/>
+              <a:gd name="connsiteX0" fmla="*/ 303139 w 303139"/>
+              <a:gd name="connsiteY0" fmla="*/ 469903 h 469903"/>
+              <a:gd name="connsiteX1" fmla="*/ 112157 w 303139"/>
+              <a:gd name="connsiteY1" fmla="*/ 445658 h 469903"/>
+              <a:gd name="connsiteX2" fmla="*/ 6715 w 303139"/>
+              <a:gd name="connsiteY2" fmla="*/ 308081 h 469903"/>
+              <a:gd name="connsiteX3" fmla="*/ 35180 w 303139"/>
+              <a:gd name="connsiteY3" fmla="*/ 124204 h 469903"/>
+              <a:gd name="connsiteX4" fmla="*/ 233289 w 303139"/>
+              <a:gd name="connsiteY4" fmla="*/ 3 h 469903"/>
+              <a:gd name="connsiteX0" fmla="*/ 302084 w 302084"/>
+              <a:gd name="connsiteY0" fmla="*/ 469903 h 469903"/>
+              <a:gd name="connsiteX1" fmla="*/ 96870 w 302084"/>
+              <a:gd name="connsiteY1" fmla="*/ 434734 h 469903"/>
+              <a:gd name="connsiteX2" fmla="*/ 5660 w 302084"/>
+              <a:gd name="connsiteY2" fmla="*/ 308081 h 469903"/>
+              <a:gd name="connsiteX3" fmla="*/ 34125 w 302084"/>
+              <a:gd name="connsiteY3" fmla="*/ 124204 h 469903"/>
+              <a:gd name="connsiteX4" fmla="*/ 232234 w 302084"/>
+              <a:gd name="connsiteY4" fmla="*/ 3 h 469903"/>
+              <a:gd name="connsiteX0" fmla="*/ 302084 w 302084"/>
+              <a:gd name="connsiteY0" fmla="*/ 469903 h 469903"/>
+              <a:gd name="connsiteX1" fmla="*/ 96870 w 302084"/>
+              <a:gd name="connsiteY1" fmla="*/ 450029 h 469903"/>
+              <a:gd name="connsiteX2" fmla="*/ 5660 w 302084"/>
+              <a:gd name="connsiteY2" fmla="*/ 308081 h 469903"/>
+              <a:gd name="connsiteX3" fmla="*/ 34125 w 302084"/>
+              <a:gd name="connsiteY3" fmla="*/ 124204 h 469903"/>
+              <a:gd name="connsiteX4" fmla="*/ 232234 w 302084"/>
+              <a:gd name="connsiteY4" fmla="*/ 3 h 469903"/>
+              <a:gd name="connsiteX0" fmla="*/ 262945 w 262945"/>
+              <a:gd name="connsiteY0" fmla="*/ 476458 h 476458"/>
+              <a:gd name="connsiteX1" fmla="*/ 96870 w 262945"/>
+              <a:gd name="connsiteY1" fmla="*/ 450029 h 476458"/>
+              <a:gd name="connsiteX2" fmla="*/ 5660 w 262945"/>
+              <a:gd name="connsiteY2" fmla="*/ 308081 h 476458"/>
+              <a:gd name="connsiteX3" fmla="*/ 34125 w 262945"/>
+              <a:gd name="connsiteY3" fmla="*/ 124204 h 476458"/>
+              <a:gd name="connsiteX4" fmla="*/ 232234 w 262945"/>
+              <a:gd name="connsiteY4" fmla="*/ 3 h 476458"/>
+              <a:gd name="connsiteX0" fmla="*/ 261364 w 261364"/>
+              <a:gd name="connsiteY0" fmla="*/ 476458 h 476458"/>
+              <a:gd name="connsiteX1" fmla="*/ 73940 w 261364"/>
+              <a:gd name="connsiteY1" fmla="*/ 458769 h 476458"/>
+              <a:gd name="connsiteX2" fmla="*/ 4079 w 261364"/>
+              <a:gd name="connsiteY2" fmla="*/ 308081 h 476458"/>
+              <a:gd name="connsiteX3" fmla="*/ 32544 w 261364"/>
+              <a:gd name="connsiteY3" fmla="*/ 124204 h 476458"/>
+              <a:gd name="connsiteX4" fmla="*/ 230653 w 261364"/>
+              <a:gd name="connsiteY4" fmla="*/ 3 h 476458"/>
+              <a:gd name="connsiteX0" fmla="*/ 300504 w 300504"/>
+              <a:gd name="connsiteY0" fmla="*/ 476458 h 476458"/>
+              <a:gd name="connsiteX1" fmla="*/ 73940 w 300504"/>
+              <a:gd name="connsiteY1" fmla="*/ 458769 h 476458"/>
+              <a:gd name="connsiteX2" fmla="*/ 4079 w 300504"/>
+              <a:gd name="connsiteY2" fmla="*/ 308081 h 476458"/>
+              <a:gd name="connsiteX3" fmla="*/ 32544 w 300504"/>
+              <a:gd name="connsiteY3" fmla="*/ 124204 h 476458"/>
+              <a:gd name="connsiteX4" fmla="*/ 230653 w 300504"/>
+              <a:gd name="connsiteY4" fmla="*/ 3 h 476458"/>
+              <a:gd name="connsiteX0" fmla="*/ 298659 w 298659"/>
+              <a:gd name="connsiteY0" fmla="*/ 476458 h 476458"/>
+              <a:gd name="connsiteX1" fmla="*/ 47188 w 298659"/>
+              <a:gd name="connsiteY1" fmla="*/ 432550 h 476458"/>
+              <a:gd name="connsiteX2" fmla="*/ 2234 w 298659"/>
+              <a:gd name="connsiteY2" fmla="*/ 308081 h 476458"/>
+              <a:gd name="connsiteX3" fmla="*/ 30699 w 298659"/>
+              <a:gd name="connsiteY3" fmla="*/ 124204 h 476458"/>
+              <a:gd name="connsiteX4" fmla="*/ 228808 w 298659"/>
+              <a:gd name="connsiteY4" fmla="*/ 3 h 476458"/>
+              <a:gd name="connsiteX0" fmla="*/ 318164 w 318164"/>
+              <a:gd name="connsiteY0" fmla="*/ 476458 h 476458"/>
+              <a:gd name="connsiteX1" fmla="*/ 66693 w 318164"/>
+              <a:gd name="connsiteY1" fmla="*/ 432550 h 476458"/>
+              <a:gd name="connsiteX2" fmla="*/ 390 w 318164"/>
+              <a:gd name="connsiteY2" fmla="*/ 279677 h 476458"/>
+              <a:gd name="connsiteX3" fmla="*/ 50204 w 318164"/>
+              <a:gd name="connsiteY3" fmla="*/ 124204 h 476458"/>
+              <a:gd name="connsiteX4" fmla="*/ 248313 w 318164"/>
+              <a:gd name="connsiteY4" fmla="*/ 3 h 476458"/>
+              <a:gd name="connsiteX0" fmla="*/ 317779 w 317779"/>
+              <a:gd name="connsiteY0" fmla="*/ 476462 h 476462"/>
+              <a:gd name="connsiteX1" fmla="*/ 66308 w 317779"/>
+              <a:gd name="connsiteY1" fmla="*/ 432554 h 476462"/>
+              <a:gd name="connsiteX2" fmla="*/ 5 w 317779"/>
+              <a:gd name="connsiteY2" fmla="*/ 279681 h 476462"/>
+              <a:gd name="connsiteX3" fmla="*/ 64051 w 317779"/>
+              <a:gd name="connsiteY3" fmla="*/ 73954 h 476462"/>
+              <a:gd name="connsiteX4" fmla="*/ 247928 w 317779"/>
+              <a:gd name="connsiteY4" fmla="*/ 7 h 476462"/>
+              <a:gd name="connsiteX0" fmla="*/ 319384 w 319384"/>
+              <a:gd name="connsiteY0" fmla="*/ 476462 h 476462"/>
+              <a:gd name="connsiteX1" fmla="*/ 121285 w 319384"/>
+              <a:gd name="connsiteY1" fmla="*/ 454403 h 476462"/>
+              <a:gd name="connsiteX2" fmla="*/ 1610 w 319384"/>
+              <a:gd name="connsiteY2" fmla="*/ 279681 h 476462"/>
+              <a:gd name="connsiteX3" fmla="*/ 65656 w 319384"/>
+              <a:gd name="connsiteY3" fmla="*/ 73954 h 476462"/>
+              <a:gd name="connsiteX4" fmla="*/ 249533 w 319384"/>
+              <a:gd name="connsiteY4" fmla="*/ 7 h 476462"/>
+              <a:gd name="connsiteX0" fmla="*/ 319384 w 319384"/>
+              <a:gd name="connsiteY0" fmla="*/ 476462 h 476462"/>
+              <a:gd name="connsiteX1" fmla="*/ 121285 w 319384"/>
+              <a:gd name="connsiteY1" fmla="*/ 454403 h 476462"/>
+              <a:gd name="connsiteX2" fmla="*/ 1610 w 319384"/>
+              <a:gd name="connsiteY2" fmla="*/ 279681 h 476462"/>
+              <a:gd name="connsiteX3" fmla="*/ 65656 w 319384"/>
+              <a:gd name="connsiteY3" fmla="*/ 73954 h 476462"/>
+              <a:gd name="connsiteX4" fmla="*/ 249533 w 319384"/>
+              <a:gd name="connsiteY4" fmla="*/ 7 h 476462"/>
+              <a:gd name="connsiteX0" fmla="*/ 318265 w 318265"/>
+              <a:gd name="connsiteY0" fmla="*/ 476462 h 476462"/>
+              <a:gd name="connsiteX1" fmla="*/ 91701 w 318265"/>
+              <a:gd name="connsiteY1" fmla="*/ 428184 h 476462"/>
+              <a:gd name="connsiteX2" fmla="*/ 491 w 318265"/>
+              <a:gd name="connsiteY2" fmla="*/ 279681 h 476462"/>
+              <a:gd name="connsiteX3" fmla="*/ 64537 w 318265"/>
+              <a:gd name="connsiteY3" fmla="*/ 73954 h 476462"/>
+              <a:gd name="connsiteX4" fmla="*/ 248414 w 318265"/>
+              <a:gd name="connsiteY4" fmla="*/ 7 h 476462"/>
+              <a:gd name="connsiteX0" fmla="*/ 318265 w 318265"/>
+              <a:gd name="connsiteY0" fmla="*/ 476462 h 476462"/>
+              <a:gd name="connsiteX1" fmla="*/ 91701 w 318265"/>
+              <a:gd name="connsiteY1" fmla="*/ 428184 h 476462"/>
+              <a:gd name="connsiteX2" fmla="*/ 491 w 318265"/>
+              <a:gd name="connsiteY2" fmla="*/ 279681 h 476462"/>
+              <a:gd name="connsiteX3" fmla="*/ 64537 w 318265"/>
+              <a:gd name="connsiteY3" fmla="*/ 73954 h 476462"/>
+              <a:gd name="connsiteX4" fmla="*/ 248414 w 318265"/>
+              <a:gd name="connsiteY4" fmla="*/ 7 h 476462"/>
+            </a:gdLst>
+            <a:ahLst/>
+            <a:cxnLst>
+              <a:cxn ang="0">
+                <a:pos x="connsiteX0" y="connsiteY0"/>
+              </a:cxn>
+              <a:cxn ang="0">
+                <a:pos x="connsiteX1" y="connsiteY1"/>
+              </a:cxn>
+              <a:cxn ang="0">
+                <a:pos x="connsiteX2" y="connsiteY2"/>
+              </a:cxn>
+              <a:cxn ang="0">
+                <a:pos x="connsiteX3" y="connsiteY3"/>
+              </a:cxn>
+              <a:cxn ang="0">
+                <a:pos x="connsiteX4" y="connsiteY4"/>
+              </a:cxn>
+            </a:cxnLst>
+            <a:rect l="l" t="t" r="r" b="b"/>
+            <a:pathLst>
+              <a:path w="318265" h="476462">
+                <a:moveTo>
+                  <a:pt x="318265" y="476462"/>
+                </a:moveTo>
+                <a:cubicBezTo>
+                  <a:pt x="281691" y="460040"/>
+                  <a:pt x="176686" y="477003"/>
+                  <a:pt x="91701" y="428184"/>
+                </a:cubicBezTo>
+                <a:cubicBezTo>
+                  <a:pt x="42297" y="401214"/>
+                  <a:pt x="5018" y="338719"/>
+                  <a:pt x="491" y="279681"/>
+                </a:cubicBezTo>
+                <a:cubicBezTo>
+                  <a:pt x="-4036" y="220643"/>
+                  <a:pt x="23217" y="120566"/>
+                  <a:pt x="64537" y="73954"/>
+                </a:cubicBezTo>
+                <a:cubicBezTo>
+                  <a:pt x="105857" y="27342"/>
+                  <a:pt x="157926" y="-522"/>
+                  <a:pt x="248414" y="7"/>
+                </a:cubicBezTo>
+              </a:path>
+            </a:pathLst>
+          </a:custGeom>
+          <a:noFill/>
+          <a:ln w="12700">
+            <a:prstDash val="sysDash"/>
+          </a:ln>
+        </p:spPr>
+        <p:style>
+          <a:lnRef idx="2">
+            <a:schemeClr val="accent1">
+              <a:shade val="50000"/>
+            </a:schemeClr>
+          </a:lnRef>
+          <a:fillRef idx="1">
+            <a:schemeClr val="accent1"/>
+          </a:fillRef>
+          <a:effectRef idx="0">
+            <a:schemeClr val="accent1"/>
+          </a:effectRef>
+          <a:fontRef idx="minor">
+            <a:schemeClr val="lt1"/>
+          </a:fontRef>
+        </p:style>
+        <p:txBody>
+          <a:bodyPr rtlCol="0" anchor="ctr"/>
+          <a:lstStyle/>
+          <a:p>
+            <a:pPr algn="ctr"/>
+            <a:endParaRPr lang="en-US" dirty="0"/>
+          </a:p>
+        </p:txBody>
+      </p:sp>
+      <p:sp>
+        <p:nvSpPr>
+          <p:cNvPr id="31" name="TextBox 30"/>
+          <p:cNvSpPr txBox="1"/>
+          <p:nvPr/>
+        </p:nvSpPr>
+        <p:spPr>
+          <a:xfrm>
+            <a:off x="1147431" y="2924944"/>
+            <a:ext cx="508245" cy="461665"/>
+          </a:xfrm>
+          <a:prstGeom prst="rect">
+            <a:avLst/>
+          </a:prstGeom>
+          <a:noFill/>
+        </p:spPr>
+        <p:txBody>
+          <a:bodyPr wrap="square" lIns="0" rIns="0" rtlCol="0">
+            <a:spAutoFit/>
+          </a:bodyPr>
+          <a:lstStyle/>
+          <a:p>
+            <a:r>
+              <a:rPr lang="fi-FI" sz="1200" i="1" dirty="0" err="1" smtClean="0"/>
+              <a:t>port</a:t>
+            </a:r>
+            <a:r>
+              <a:rPr lang="fi-FI" sz="1200" i="1" dirty="0" smtClean="0"/>
+              <a:t> </a:t>
+            </a:r>
+            <a:r>
+              <a:rPr lang="fi-FI" sz="1200" i="1" dirty="0" err="1" smtClean="0"/>
+              <a:t>maps</a:t>
+            </a:r>
+            <a:endParaRPr lang="en-US" sz="1200" i="1" dirty="0"/>
+          </a:p>
+        </p:txBody>
+      </p:sp>
+      <p:sp>
+        <p:nvSpPr>
+          <p:cNvPr id="30" name="Freeform 29"/>
+          <p:cNvSpPr/>
+          <p:nvPr/>
+        </p:nvSpPr>
+        <p:spPr>
+          <a:xfrm>
+            <a:off x="1729603" y="2700784"/>
+            <a:ext cx="142097" cy="519269"/>
+          </a:xfrm>
+          <a:custGeom>
+            <a:avLst/>
+            <a:gdLst>
+              <a:gd name="connsiteX0" fmla="*/ 266372 w 266372"/>
+              <a:gd name="connsiteY0" fmla="*/ 527156 h 527156"/>
+              <a:gd name="connsiteX1" fmla="*/ 50472 w 266372"/>
+              <a:gd name="connsiteY1" fmla="*/ 311256 h 527156"/>
+              <a:gd name="connsiteX2" fmla="*/ 12372 w 266372"/>
+              <a:gd name="connsiteY2" fmla="*/ 50906 h 527156"/>
+              <a:gd name="connsiteX3" fmla="*/ 221922 w 266372"/>
+              <a:gd name="connsiteY3" fmla="*/ 106 h 527156"/>
+              <a:gd name="connsiteX0" fmla="*/ 279422 w 279422"/>
+              <a:gd name="connsiteY0" fmla="*/ 529407 h 529407"/>
+              <a:gd name="connsiteX1" fmla="*/ 31772 w 279422"/>
+              <a:gd name="connsiteY1" fmla="*/ 415107 h 529407"/>
+              <a:gd name="connsiteX2" fmla="*/ 25422 w 279422"/>
+              <a:gd name="connsiteY2" fmla="*/ 53157 h 529407"/>
+              <a:gd name="connsiteX3" fmla="*/ 234972 w 279422"/>
+              <a:gd name="connsiteY3" fmla="*/ 2357 h 529407"/>
+              <a:gd name="connsiteX0" fmla="*/ 283278 w 283278"/>
+              <a:gd name="connsiteY0" fmla="*/ 527053 h 527053"/>
+              <a:gd name="connsiteX1" fmla="*/ 35628 w 283278"/>
+              <a:gd name="connsiteY1" fmla="*/ 412753 h 527053"/>
+              <a:gd name="connsiteX2" fmla="*/ 22928 w 283278"/>
+              <a:gd name="connsiteY2" fmla="*/ 146053 h 527053"/>
+              <a:gd name="connsiteX3" fmla="*/ 238828 w 283278"/>
+              <a:gd name="connsiteY3" fmla="*/ 3 h 527053"/>
+              <a:gd name="connsiteX0" fmla="*/ 277708 w 277708"/>
+              <a:gd name="connsiteY0" fmla="*/ 527053 h 527053"/>
+              <a:gd name="connsiteX1" fmla="*/ 42758 w 277708"/>
+              <a:gd name="connsiteY1" fmla="*/ 374653 h 527053"/>
+              <a:gd name="connsiteX2" fmla="*/ 17358 w 277708"/>
+              <a:gd name="connsiteY2" fmla="*/ 146053 h 527053"/>
+              <a:gd name="connsiteX3" fmla="*/ 233258 w 277708"/>
+              <a:gd name="connsiteY3" fmla="*/ 3 h 527053"/>
+              <a:gd name="connsiteX0" fmla="*/ 304252 w 304252"/>
+              <a:gd name="connsiteY0" fmla="*/ 469903 h 469903"/>
+              <a:gd name="connsiteX1" fmla="*/ 43902 w 304252"/>
+              <a:gd name="connsiteY1" fmla="*/ 374653 h 469903"/>
+              <a:gd name="connsiteX2" fmla="*/ 18502 w 304252"/>
+              <a:gd name="connsiteY2" fmla="*/ 146053 h 469903"/>
+              <a:gd name="connsiteX3" fmla="*/ 234402 w 304252"/>
+              <a:gd name="connsiteY3" fmla="*/ 3 h 469903"/>
+              <a:gd name="connsiteX0" fmla="*/ 317253 w 317253"/>
+              <a:gd name="connsiteY0" fmla="*/ 469903 h 469903"/>
+              <a:gd name="connsiteX1" fmla="*/ 31503 w 317253"/>
+              <a:gd name="connsiteY1" fmla="*/ 406403 h 469903"/>
+              <a:gd name="connsiteX2" fmla="*/ 31503 w 317253"/>
+              <a:gd name="connsiteY2" fmla="*/ 146053 h 469903"/>
+              <a:gd name="connsiteX3" fmla="*/ 247403 w 317253"/>
+              <a:gd name="connsiteY3" fmla="*/ 3 h 469903"/>
+              <a:gd name="connsiteX0" fmla="*/ 308938 w 308938"/>
+              <a:gd name="connsiteY0" fmla="*/ 469903 h 479054"/>
+              <a:gd name="connsiteX1" fmla="*/ 175589 w 308938"/>
+              <a:gd name="connsiteY1" fmla="*/ 476254 h 479054"/>
+              <a:gd name="connsiteX2" fmla="*/ 23188 w 308938"/>
+              <a:gd name="connsiteY2" fmla="*/ 406403 h 479054"/>
+              <a:gd name="connsiteX3" fmla="*/ 23188 w 308938"/>
+              <a:gd name="connsiteY3" fmla="*/ 146053 h 479054"/>
+              <a:gd name="connsiteX4" fmla="*/ 239088 w 308938"/>
+              <a:gd name="connsiteY4" fmla="*/ 3 h 479054"/>
+              <a:gd name="connsiteX0" fmla="*/ 314893 w 314893"/>
+              <a:gd name="connsiteY0" fmla="*/ 469903 h 479054"/>
+              <a:gd name="connsiteX1" fmla="*/ 181544 w 314893"/>
+              <a:gd name="connsiteY1" fmla="*/ 476254 h 479054"/>
+              <a:gd name="connsiteX2" fmla="*/ 18469 w 314893"/>
+              <a:gd name="connsiteY2" fmla="*/ 351780 h 479054"/>
+              <a:gd name="connsiteX3" fmla="*/ 29143 w 314893"/>
+              <a:gd name="connsiteY3" fmla="*/ 146053 h 479054"/>
+              <a:gd name="connsiteX4" fmla="*/ 245043 w 314893"/>
+              <a:gd name="connsiteY4" fmla="*/ 3 h 479054"/>
+              <a:gd name="connsiteX0" fmla="*/ 313023 w 313023"/>
+              <a:gd name="connsiteY0" fmla="*/ 469903 h 469903"/>
+              <a:gd name="connsiteX1" fmla="*/ 151209 w 313023"/>
+              <a:gd name="connsiteY1" fmla="*/ 465330 h 469903"/>
+              <a:gd name="connsiteX2" fmla="*/ 16599 w 313023"/>
+              <a:gd name="connsiteY2" fmla="*/ 351780 h 469903"/>
+              <a:gd name="connsiteX3" fmla="*/ 27273 w 313023"/>
+              <a:gd name="connsiteY3" fmla="*/ 146053 h 469903"/>
+              <a:gd name="connsiteX4" fmla="*/ 243173 w 313023"/>
+              <a:gd name="connsiteY4" fmla="*/ 3 h 469903"/>
+              <a:gd name="connsiteX0" fmla="*/ 305299 w 305299"/>
+              <a:gd name="connsiteY0" fmla="*/ 469903 h 469903"/>
+              <a:gd name="connsiteX1" fmla="*/ 143485 w 305299"/>
+              <a:gd name="connsiteY1" fmla="*/ 465330 h 469903"/>
+              <a:gd name="connsiteX2" fmla="*/ 8875 w 305299"/>
+              <a:gd name="connsiteY2" fmla="*/ 351780 h 469903"/>
+              <a:gd name="connsiteX3" fmla="*/ 37340 w 305299"/>
+              <a:gd name="connsiteY3" fmla="*/ 124204 h 469903"/>
+              <a:gd name="connsiteX4" fmla="*/ 235449 w 305299"/>
+              <a:gd name="connsiteY4" fmla="*/ 3 h 469903"/>
+              <a:gd name="connsiteX0" fmla="*/ 305299 w 305299"/>
+              <a:gd name="connsiteY0" fmla="*/ 469903 h 469903"/>
+              <a:gd name="connsiteX1" fmla="*/ 143485 w 305299"/>
+              <a:gd name="connsiteY1" fmla="*/ 465330 h 469903"/>
+              <a:gd name="connsiteX2" fmla="*/ 8875 w 305299"/>
+              <a:gd name="connsiteY2" fmla="*/ 308081 h 469903"/>
+              <a:gd name="connsiteX3" fmla="*/ 37340 w 305299"/>
+              <a:gd name="connsiteY3" fmla="*/ 124204 h 469903"/>
+              <a:gd name="connsiteX4" fmla="*/ 235449 w 305299"/>
+              <a:gd name="connsiteY4" fmla="*/ 3 h 469903"/>
+              <a:gd name="connsiteX0" fmla="*/ 305299 w 305299"/>
+              <a:gd name="connsiteY0" fmla="*/ 469903 h 469903"/>
+              <a:gd name="connsiteX1" fmla="*/ 8875 w 305299"/>
+              <a:gd name="connsiteY1" fmla="*/ 308081 h 469903"/>
+              <a:gd name="connsiteX2" fmla="*/ 37340 w 305299"/>
+              <a:gd name="connsiteY2" fmla="*/ 124204 h 469903"/>
+              <a:gd name="connsiteX3" fmla="*/ 235449 w 305299"/>
+              <a:gd name="connsiteY3" fmla="*/ 3 h 469903"/>
+              <a:gd name="connsiteX0" fmla="*/ 303139 w 303139"/>
+              <a:gd name="connsiteY0" fmla="*/ 469903 h 469903"/>
+              <a:gd name="connsiteX1" fmla="*/ 112157 w 303139"/>
+              <a:gd name="connsiteY1" fmla="*/ 445658 h 469903"/>
+              <a:gd name="connsiteX2" fmla="*/ 6715 w 303139"/>
+              <a:gd name="connsiteY2" fmla="*/ 308081 h 469903"/>
+              <a:gd name="connsiteX3" fmla="*/ 35180 w 303139"/>
+              <a:gd name="connsiteY3" fmla="*/ 124204 h 469903"/>
+              <a:gd name="connsiteX4" fmla="*/ 233289 w 303139"/>
+              <a:gd name="connsiteY4" fmla="*/ 3 h 469903"/>
+              <a:gd name="connsiteX0" fmla="*/ 302084 w 302084"/>
+              <a:gd name="connsiteY0" fmla="*/ 469903 h 469903"/>
+              <a:gd name="connsiteX1" fmla="*/ 96870 w 302084"/>
+              <a:gd name="connsiteY1" fmla="*/ 434734 h 469903"/>
+              <a:gd name="connsiteX2" fmla="*/ 5660 w 302084"/>
+              <a:gd name="connsiteY2" fmla="*/ 308081 h 469903"/>
+              <a:gd name="connsiteX3" fmla="*/ 34125 w 302084"/>
+              <a:gd name="connsiteY3" fmla="*/ 124204 h 469903"/>
+              <a:gd name="connsiteX4" fmla="*/ 232234 w 302084"/>
+              <a:gd name="connsiteY4" fmla="*/ 3 h 469903"/>
+              <a:gd name="connsiteX0" fmla="*/ 302084 w 302084"/>
+              <a:gd name="connsiteY0" fmla="*/ 469903 h 469903"/>
+              <a:gd name="connsiteX1" fmla="*/ 96870 w 302084"/>
+              <a:gd name="connsiteY1" fmla="*/ 450029 h 469903"/>
+              <a:gd name="connsiteX2" fmla="*/ 5660 w 302084"/>
+              <a:gd name="connsiteY2" fmla="*/ 308081 h 469903"/>
+              <a:gd name="connsiteX3" fmla="*/ 34125 w 302084"/>
+              <a:gd name="connsiteY3" fmla="*/ 124204 h 469903"/>
+              <a:gd name="connsiteX4" fmla="*/ 232234 w 302084"/>
+              <a:gd name="connsiteY4" fmla="*/ 3 h 469903"/>
+              <a:gd name="connsiteX0" fmla="*/ 262945 w 262945"/>
+              <a:gd name="connsiteY0" fmla="*/ 476458 h 476458"/>
+              <a:gd name="connsiteX1" fmla="*/ 96870 w 262945"/>
+              <a:gd name="connsiteY1" fmla="*/ 450029 h 476458"/>
+              <a:gd name="connsiteX2" fmla="*/ 5660 w 262945"/>
+              <a:gd name="connsiteY2" fmla="*/ 308081 h 476458"/>
+              <a:gd name="connsiteX3" fmla="*/ 34125 w 262945"/>
+              <a:gd name="connsiteY3" fmla="*/ 124204 h 476458"/>
+              <a:gd name="connsiteX4" fmla="*/ 232234 w 262945"/>
+              <a:gd name="connsiteY4" fmla="*/ 3 h 476458"/>
+              <a:gd name="connsiteX0" fmla="*/ 261364 w 261364"/>
+              <a:gd name="connsiteY0" fmla="*/ 476458 h 476458"/>
+              <a:gd name="connsiteX1" fmla="*/ 73940 w 261364"/>
+              <a:gd name="connsiteY1" fmla="*/ 458769 h 476458"/>
+              <a:gd name="connsiteX2" fmla="*/ 4079 w 261364"/>
+              <a:gd name="connsiteY2" fmla="*/ 308081 h 476458"/>
+              <a:gd name="connsiteX3" fmla="*/ 32544 w 261364"/>
+              <a:gd name="connsiteY3" fmla="*/ 124204 h 476458"/>
+              <a:gd name="connsiteX4" fmla="*/ 230653 w 261364"/>
+              <a:gd name="connsiteY4" fmla="*/ 3 h 476458"/>
+              <a:gd name="connsiteX0" fmla="*/ 300504 w 300504"/>
+              <a:gd name="connsiteY0" fmla="*/ 476458 h 476458"/>
+              <a:gd name="connsiteX1" fmla="*/ 73940 w 300504"/>
+              <a:gd name="connsiteY1" fmla="*/ 458769 h 476458"/>
+              <a:gd name="connsiteX2" fmla="*/ 4079 w 300504"/>
+              <a:gd name="connsiteY2" fmla="*/ 308081 h 476458"/>
+              <a:gd name="connsiteX3" fmla="*/ 32544 w 300504"/>
+              <a:gd name="connsiteY3" fmla="*/ 124204 h 476458"/>
+              <a:gd name="connsiteX4" fmla="*/ 230653 w 300504"/>
+              <a:gd name="connsiteY4" fmla="*/ 3 h 476458"/>
+              <a:gd name="connsiteX0" fmla="*/ 298659 w 298659"/>
+              <a:gd name="connsiteY0" fmla="*/ 476458 h 476458"/>
+              <a:gd name="connsiteX1" fmla="*/ 47188 w 298659"/>
+              <a:gd name="connsiteY1" fmla="*/ 432550 h 476458"/>
+              <a:gd name="connsiteX2" fmla="*/ 2234 w 298659"/>
+              <a:gd name="connsiteY2" fmla="*/ 308081 h 476458"/>
+              <a:gd name="connsiteX3" fmla="*/ 30699 w 298659"/>
+              <a:gd name="connsiteY3" fmla="*/ 124204 h 476458"/>
+              <a:gd name="connsiteX4" fmla="*/ 228808 w 298659"/>
+              <a:gd name="connsiteY4" fmla="*/ 3 h 476458"/>
+              <a:gd name="connsiteX0" fmla="*/ 318164 w 318164"/>
+              <a:gd name="connsiteY0" fmla="*/ 476458 h 476458"/>
+              <a:gd name="connsiteX1" fmla="*/ 66693 w 318164"/>
+              <a:gd name="connsiteY1" fmla="*/ 432550 h 476458"/>
+              <a:gd name="connsiteX2" fmla="*/ 390 w 318164"/>
+              <a:gd name="connsiteY2" fmla="*/ 279677 h 476458"/>
+              <a:gd name="connsiteX3" fmla="*/ 50204 w 318164"/>
+              <a:gd name="connsiteY3" fmla="*/ 124204 h 476458"/>
+              <a:gd name="connsiteX4" fmla="*/ 248313 w 318164"/>
+              <a:gd name="connsiteY4" fmla="*/ 3 h 476458"/>
+              <a:gd name="connsiteX0" fmla="*/ 317779 w 317779"/>
+              <a:gd name="connsiteY0" fmla="*/ 476462 h 476462"/>
+              <a:gd name="connsiteX1" fmla="*/ 66308 w 317779"/>
+              <a:gd name="connsiteY1" fmla="*/ 432554 h 476462"/>
+              <a:gd name="connsiteX2" fmla="*/ 5 w 317779"/>
+              <a:gd name="connsiteY2" fmla="*/ 279681 h 476462"/>
+              <a:gd name="connsiteX3" fmla="*/ 64051 w 317779"/>
+              <a:gd name="connsiteY3" fmla="*/ 73954 h 476462"/>
+              <a:gd name="connsiteX4" fmla="*/ 247928 w 317779"/>
+              <a:gd name="connsiteY4" fmla="*/ 7 h 476462"/>
+              <a:gd name="connsiteX0" fmla="*/ 319384 w 319384"/>
+              <a:gd name="connsiteY0" fmla="*/ 476462 h 476462"/>
+              <a:gd name="connsiteX1" fmla="*/ 121285 w 319384"/>
+              <a:gd name="connsiteY1" fmla="*/ 454403 h 476462"/>
+              <a:gd name="connsiteX2" fmla="*/ 1610 w 319384"/>
+              <a:gd name="connsiteY2" fmla="*/ 279681 h 476462"/>
+              <a:gd name="connsiteX3" fmla="*/ 65656 w 319384"/>
+              <a:gd name="connsiteY3" fmla="*/ 73954 h 476462"/>
+              <a:gd name="connsiteX4" fmla="*/ 249533 w 319384"/>
+              <a:gd name="connsiteY4" fmla="*/ 7 h 476462"/>
+              <a:gd name="connsiteX0" fmla="*/ 319384 w 319384"/>
+              <a:gd name="connsiteY0" fmla="*/ 476462 h 476462"/>
+              <a:gd name="connsiteX1" fmla="*/ 121285 w 319384"/>
+              <a:gd name="connsiteY1" fmla="*/ 454403 h 476462"/>
+              <a:gd name="connsiteX2" fmla="*/ 1610 w 319384"/>
+              <a:gd name="connsiteY2" fmla="*/ 279681 h 476462"/>
+              <a:gd name="connsiteX3" fmla="*/ 65656 w 319384"/>
+              <a:gd name="connsiteY3" fmla="*/ 73954 h 476462"/>
+              <a:gd name="connsiteX4" fmla="*/ 249533 w 319384"/>
+              <a:gd name="connsiteY4" fmla="*/ 7 h 476462"/>
+              <a:gd name="connsiteX0" fmla="*/ 318265 w 318265"/>
+              <a:gd name="connsiteY0" fmla="*/ 476462 h 476462"/>
+              <a:gd name="connsiteX1" fmla="*/ 91701 w 318265"/>
+              <a:gd name="connsiteY1" fmla="*/ 428184 h 476462"/>
+              <a:gd name="connsiteX2" fmla="*/ 491 w 318265"/>
+              <a:gd name="connsiteY2" fmla="*/ 279681 h 476462"/>
+              <a:gd name="connsiteX3" fmla="*/ 64537 w 318265"/>
+              <a:gd name="connsiteY3" fmla="*/ 73954 h 476462"/>
+              <a:gd name="connsiteX4" fmla="*/ 248414 w 318265"/>
+              <a:gd name="connsiteY4" fmla="*/ 7 h 476462"/>
+              <a:gd name="connsiteX0" fmla="*/ 318265 w 318265"/>
+              <a:gd name="connsiteY0" fmla="*/ 476462 h 476462"/>
+              <a:gd name="connsiteX1" fmla="*/ 91701 w 318265"/>
+              <a:gd name="connsiteY1" fmla="*/ 428184 h 476462"/>
+              <a:gd name="connsiteX2" fmla="*/ 491 w 318265"/>
+              <a:gd name="connsiteY2" fmla="*/ 279681 h 476462"/>
+              <a:gd name="connsiteX3" fmla="*/ 64537 w 318265"/>
+              <a:gd name="connsiteY3" fmla="*/ 73954 h 476462"/>
+              <a:gd name="connsiteX4" fmla="*/ 248414 w 318265"/>
+              <a:gd name="connsiteY4" fmla="*/ 7 h 476462"/>
+            </a:gdLst>
+            <a:ahLst/>
+            <a:cxnLst>
+              <a:cxn ang="0">
+                <a:pos x="connsiteX0" y="connsiteY0"/>
+              </a:cxn>
+              <a:cxn ang="0">
+                <a:pos x="connsiteX1" y="connsiteY1"/>
+              </a:cxn>
+              <a:cxn ang="0">
+                <a:pos x="connsiteX2" y="connsiteY2"/>
+              </a:cxn>
+              <a:cxn ang="0">
+                <a:pos x="connsiteX3" y="connsiteY3"/>
+              </a:cxn>
+              <a:cxn ang="0">
+                <a:pos x="connsiteX4" y="connsiteY4"/>
+              </a:cxn>
+            </a:cxnLst>
+            <a:rect l="l" t="t" r="r" b="b"/>
+            <a:pathLst>
+              <a:path w="318265" h="476462">
+                <a:moveTo>
+                  <a:pt x="318265" y="476462"/>
+                </a:moveTo>
+                <a:cubicBezTo>
+                  <a:pt x="281691" y="460040"/>
+                  <a:pt x="176686" y="477003"/>
+                  <a:pt x="91701" y="428184"/>
+                </a:cubicBezTo>
+                <a:cubicBezTo>
+                  <a:pt x="42297" y="401214"/>
+                  <a:pt x="5018" y="338719"/>
+                  <a:pt x="491" y="279681"/>
+                </a:cubicBezTo>
+                <a:cubicBezTo>
+                  <a:pt x="-4036" y="220643"/>
+                  <a:pt x="23217" y="120566"/>
+                  <a:pt x="64537" y="73954"/>
+                </a:cubicBezTo>
+                <a:cubicBezTo>
+                  <a:pt x="105857" y="27342"/>
+                  <a:pt x="157926" y="-522"/>
+                  <a:pt x="248414" y="7"/>
+                </a:cubicBezTo>
+              </a:path>
+            </a:pathLst>
+          </a:custGeom>
+          <a:noFill/>
+          <a:ln w="12700">
+            <a:prstDash val="sysDash"/>
+          </a:ln>
+        </p:spPr>
+        <p:style>
+          <a:lnRef idx="2">
+            <a:schemeClr val="accent1">
+              <a:shade val="50000"/>
+            </a:schemeClr>
+          </a:lnRef>
+          <a:fillRef idx="1">
+            <a:schemeClr val="accent1"/>
+          </a:fillRef>
+          <a:effectRef idx="0">
+            <a:schemeClr val="accent1"/>
+          </a:effectRef>
+          <a:fontRef idx="minor">
+            <a:schemeClr val="lt1"/>
+          </a:fontRef>
+        </p:style>
+        <p:txBody>
+          <a:bodyPr rtlCol="0" anchor="ctr"/>
+          <a:lstStyle/>
+          <a:p>
+            <a:pPr algn="ctr"/>
+            <a:endParaRPr lang="en-US" dirty="0"/>
+          </a:p>
+        </p:txBody>
+      </p:sp>
+      <p:sp>
+        <p:nvSpPr>
+          <p:cNvPr id="5" name="Flowchart: Off-page Connector 4"/>
+          <p:cNvSpPr/>
+          <p:nvPr/>
+        </p:nvSpPr>
+        <p:spPr>
+          <a:xfrm rot="16200000" flipH="1">
+            <a:off x="1799672" y="2439199"/>
+            <a:ext cx="360040" cy="360000"/>
+          </a:xfrm>
+          <a:prstGeom prst="flowChartOffpageConnector">
+            <a:avLst/>
+          </a:prstGeom>
+          <a:solidFill>
+            <a:srgbClr val="00B050"/>
+          </a:solidFill>
+          <a:ln>
+            <a:solidFill>
+              <a:schemeClr val="tx1"/>
+            </a:solidFill>
+          </a:ln>
+        </p:spPr>
+        <p:style>
+          <a:lnRef idx="2">
+            <a:schemeClr val="accent1">
+              <a:shade val="50000"/>
+            </a:schemeClr>
+          </a:lnRef>
+          <a:fillRef idx="1">
+            <a:schemeClr val="accent1"/>
+          </a:fillRef>
+          <a:effectRef idx="0">
+            <a:schemeClr val="accent1"/>
+          </a:effectRef>
+          <a:fontRef idx="minor">
+            <a:schemeClr val="lt1"/>
+          </a:fontRef>
+        </p:style>
+        <p:txBody>
+          <a:bodyPr rtlCol="0" anchor="ctr"/>
+          <a:lstStyle/>
+          <a:p>
+            <a:pPr algn="ctr"/>
+            <a:endParaRPr lang="en-US" sz="1200"/>
+          </a:p>
+        </p:txBody>
+      </p:sp>
+      <p:sp>
+        <p:nvSpPr>
+          <p:cNvPr id="20" name="Flowchart: Off-page Connector 19"/>
+          <p:cNvSpPr/>
+          <p:nvPr/>
+        </p:nvSpPr>
+        <p:spPr>
+          <a:xfrm rot="16200000" flipH="1">
+            <a:off x="1949733" y="3092987"/>
+            <a:ext cx="95962" cy="252028"/>
+          </a:xfrm>
+          <a:prstGeom prst="flowChartOffpageConnector">
+            <a:avLst/>
+          </a:prstGeom>
+          <a:solidFill>
+            <a:schemeClr val="tx1"/>
+          </a:solidFill>
+          <a:ln>
+            <a:solidFill>
+              <a:schemeClr val="tx1"/>
+            </a:solidFill>
+          </a:ln>
+        </p:spPr>
+        <p:style>
+          <a:lnRef idx="2">
+            <a:schemeClr val="accent1">
+              <a:shade val="50000"/>
+            </a:schemeClr>
+          </a:lnRef>
+          <a:fillRef idx="1">
+            <a:schemeClr val="accent1"/>
+          </a:fillRef>
+          <a:effectRef idx="0">
+            <a:schemeClr val="accent1"/>
+          </a:effectRef>
+          <a:fontRef idx="minor">
+            <a:schemeClr val="lt1"/>
+          </a:fontRef>
+        </p:style>
+        <p:txBody>
+          <a:bodyPr rtlCol="0" anchor="ctr"/>
+          <a:lstStyle/>
+          <a:p>
+            <a:pPr algn="ctr"/>
+            <a:endParaRPr lang="en-US" sz="1200"/>
+          </a:p>
+        </p:txBody>
+      </p:sp>
+      <p:sp>
+        <p:nvSpPr>
+          <p:cNvPr id="21" name="Flowchart: Off-page Connector 20"/>
+          <p:cNvSpPr/>
+          <p:nvPr/>
+        </p:nvSpPr>
+        <p:spPr>
+          <a:xfrm rot="16200000" flipH="1">
+            <a:off x="1949733" y="3291009"/>
+            <a:ext cx="95962" cy="252028"/>
+          </a:xfrm>
+          <a:prstGeom prst="flowChartOffpageConnector">
+            <a:avLst/>
+          </a:prstGeom>
+          <a:solidFill>
+            <a:schemeClr val="tx1"/>
+          </a:solidFill>
+          <a:ln>
+            <a:solidFill>
+              <a:schemeClr val="tx1"/>
+            </a:solidFill>
+          </a:ln>
+        </p:spPr>
+        <p:style>
+          <a:lnRef idx="2">
+            <a:schemeClr val="accent1">
+              <a:shade val="50000"/>
+            </a:schemeClr>
+          </a:lnRef>
+          <a:fillRef idx="1">
+            <a:schemeClr val="accent1"/>
+          </a:fillRef>
+          <a:effectRef idx="0">
+            <a:schemeClr val="accent1"/>
+          </a:effectRef>
+          <a:fontRef idx="minor">
+            <a:schemeClr val="lt1"/>
+          </a:fontRef>
+        </p:style>
+        <p:txBody>
+          <a:bodyPr rtlCol="0" anchor="ctr"/>
+          <a:lstStyle/>
+          <a:p>
+            <a:pPr algn="ctr"/>
+            <a:endParaRPr lang="en-US" sz="1200"/>
+          </a:p>
+        </p:txBody>
+      </p:sp>
+      <p:sp>
+        <p:nvSpPr>
+          <p:cNvPr id="23" name="Flowchart: Off-page Connector 22"/>
+          <p:cNvSpPr/>
+          <p:nvPr/>
+        </p:nvSpPr>
+        <p:spPr>
+          <a:xfrm rot="16200000" flipV="1">
+            <a:off x="1913729" y="3471029"/>
+            <a:ext cx="95962" cy="252028"/>
+          </a:xfrm>
+          <a:prstGeom prst="flowChartOffpageConnector">
+            <a:avLst/>
+          </a:prstGeom>
+          <a:solidFill>
+            <a:schemeClr val="tx1"/>
+          </a:solidFill>
+          <a:ln>
+            <a:solidFill>
+              <a:schemeClr val="tx1"/>
+            </a:solidFill>
+          </a:ln>
+        </p:spPr>
+        <p:style>
+          <a:lnRef idx="2">
+            <a:schemeClr val="accent1">
+              <a:shade val="50000"/>
+            </a:schemeClr>
+          </a:lnRef>
+          <a:fillRef idx="1">
+            <a:schemeClr val="accent1"/>
+          </a:fillRef>
+          <a:effectRef idx="0">
+            <a:schemeClr val="accent1"/>
+          </a:effectRef>
+          <a:fontRef idx="minor">
+            <a:schemeClr val="lt1"/>
+          </a:fontRef>
+        </p:style>
+        <p:txBody>
+          <a:bodyPr rtlCol="0" anchor="ctr"/>
+          <a:lstStyle/>
+          <a:p>
+            <a:pPr algn="ctr"/>
+            <a:endParaRPr lang="en-US" sz="1200"/>
+          </a:p>
+        </p:txBody>
+      </p:sp>
+      <p:sp>
+        <p:nvSpPr>
+          <p:cNvPr id="32" name="TextBox 31"/>
+          <p:cNvSpPr txBox="1"/>
+          <p:nvPr/>
+        </p:nvSpPr>
+        <p:spPr>
+          <a:xfrm>
+            <a:off x="2312132" y="2870938"/>
+            <a:ext cx="495672" cy="276999"/>
+          </a:xfrm>
+          <a:prstGeom prst="rect">
+            <a:avLst/>
+          </a:prstGeom>
+          <a:noFill/>
+        </p:spPr>
+        <p:txBody>
+          <a:bodyPr wrap="square" rtlCol="0">
+            <a:spAutoFit/>
+          </a:bodyPr>
+          <a:lstStyle/>
+          <a:p>
+            <a:r>
+              <a:rPr lang="fi-FI" sz="1200" dirty="0" smtClean="0"/>
+              <a:t>=</a:t>
+            </a:r>
+            <a:endParaRPr lang="en-US" sz="1200" dirty="0"/>
+          </a:p>
+        </p:txBody>
+      </p:sp>
+    </p:spTree>
+    <p:extLst>
+      <p:ext uri="{BB962C8B-B14F-4D97-AF65-F5344CB8AC3E}">
+        <p14:creationId xmlns:p14="http://schemas.microsoft.com/office/powerpoint/2010/main" val="1953917506"/>
+      </p:ext>
+    </p:extLst>
+  </p:cSld>
+  <p:clrMapOvr>
+    <a:masterClrMapping/>
+  </p:clrMapOvr>
+  <p:timing>
+    <p:tnLst>
+      <p:par>
+        <p:cTn id="1" dur="indefinite" restart="never" nodeType="tmRoot"/>
+      </p:par>
+    </p:tnLst>
+  </p:timing>
+</p:sld>
+</file>
+
 <file path=ppt/theme/theme1.xml><?xml version="1.0" encoding="utf-8"?>
 <a:theme xmlns:a="http://schemas.openxmlformats.org/drawingml/2006/main" name="Office Theme">
   <a:themeElements>

</xml_diff>